<commit_message>
fixed name of Veselin Milyovski in presentation
</commit_message>
<xml_diff>
--- a/UILiveChat.pptx
+++ b/UILiveChat.pptx
@@ -226,7 +226,7 @@
           <a:p>
             <a:fld id="{34F2C2FC-66EA-4D06-8ACA-ADEFBDAD486D}" type="datetimeFigureOut">
               <a:rPr lang="en-US" smtClean="0"/>
-              <a:t>07-Nov-17</a:t>
+              <a:t>08-Nov-17</a:t>
             </a:fld>
             <a:endParaRPr lang="en-US"/>
           </a:p>
@@ -1587,7 +1587,7 @@
           <a:p>
             <a:fld id="{DFE909EE-B26B-47B1-B3E5-177C23FDE45E}" type="datetimeFigureOut">
               <a:rPr lang="en-US" smtClean="0"/>
-              <a:t>07-Nov-17</a:t>
+              <a:t>08-Nov-17</a:t>
             </a:fld>
             <a:endParaRPr lang="en-US"/>
           </a:p>
@@ -1859,7 +1859,7 @@
           <a:p>
             <a:fld id="{DFE909EE-B26B-47B1-B3E5-177C23FDE45E}" type="datetimeFigureOut">
               <a:rPr lang="en-US" smtClean="0"/>
-              <a:t>07-Nov-17</a:t>
+              <a:t>08-Nov-17</a:t>
             </a:fld>
             <a:endParaRPr lang="en-US"/>
           </a:p>
@@ -2090,7 +2090,7 @@
           <a:p>
             <a:fld id="{DFE909EE-B26B-47B1-B3E5-177C23FDE45E}" type="datetimeFigureOut">
               <a:rPr lang="en-US" smtClean="0"/>
-              <a:t>07-Nov-17</a:t>
+              <a:t>08-Nov-17</a:t>
             </a:fld>
             <a:endParaRPr lang="en-US"/>
           </a:p>
@@ -2400,7 +2400,7 @@
           <a:p>
             <a:fld id="{DFE909EE-B26B-47B1-B3E5-177C23FDE45E}" type="datetimeFigureOut">
               <a:rPr lang="en-US" smtClean="0"/>
-              <a:t>07-Nov-17</a:t>
+              <a:t>08-Nov-17</a:t>
             </a:fld>
             <a:endParaRPr lang="en-US"/>
           </a:p>
@@ -2873,7 +2873,7 @@
           <a:p>
             <a:fld id="{DFE909EE-B26B-47B1-B3E5-177C23FDE45E}" type="datetimeFigureOut">
               <a:rPr lang="en-US" smtClean="0"/>
-              <a:t>07-Nov-17</a:t>
+              <a:t>08-Nov-17</a:t>
             </a:fld>
             <a:endParaRPr lang="en-US"/>
           </a:p>
@@ -3420,7 +3420,7 @@
           <a:p>
             <a:fld id="{DFE909EE-B26B-47B1-B3E5-177C23FDE45E}" type="datetimeFigureOut">
               <a:rPr lang="en-US" smtClean="0"/>
-              <a:t>07-Nov-17</a:t>
+              <a:t>08-Nov-17</a:t>
             </a:fld>
             <a:endParaRPr lang="en-US"/>
           </a:p>
@@ -4194,7 +4194,7 @@
           <a:p>
             <a:fld id="{DFE909EE-B26B-47B1-B3E5-177C23FDE45E}" type="datetimeFigureOut">
               <a:rPr lang="en-US" smtClean="0"/>
-              <a:t>07-Nov-17</a:t>
+              <a:t>08-Nov-17</a:t>
             </a:fld>
             <a:endParaRPr lang="en-US"/>
           </a:p>
@@ -4369,7 +4369,7 @@
           <a:p>
             <a:fld id="{DFE909EE-B26B-47B1-B3E5-177C23FDE45E}" type="datetimeFigureOut">
               <a:rPr lang="en-US" smtClean="0"/>
-              <a:t>07-Nov-17</a:t>
+              <a:t>08-Nov-17</a:t>
             </a:fld>
             <a:endParaRPr lang="en-US"/>
           </a:p>
@@ -4592,7 +4592,7 @@
           <a:p>
             <a:fld id="{DFE909EE-B26B-47B1-B3E5-177C23FDE45E}" type="datetimeFigureOut">
               <a:rPr lang="en-US" smtClean="0"/>
-              <a:t>07-Nov-17</a:t>
+              <a:t>08-Nov-17</a:t>
             </a:fld>
             <a:endParaRPr lang="en-US"/>
           </a:p>
@@ -4777,7 +4777,7 @@
           <a:p>
             <a:fld id="{DFE909EE-B26B-47B1-B3E5-177C23FDE45E}" type="datetimeFigureOut">
               <a:rPr lang="en-US" smtClean="0"/>
-              <a:t>07-Nov-17</a:t>
+              <a:t>08-Nov-17</a:t>
             </a:fld>
             <a:endParaRPr lang="en-US"/>
           </a:p>
@@ -5066,7 +5066,7 @@
           <a:p>
             <a:fld id="{DFE909EE-B26B-47B1-B3E5-177C23FDE45E}" type="datetimeFigureOut">
               <a:rPr lang="en-US" smtClean="0"/>
-              <a:t>07-Nov-17</a:t>
+              <a:t>08-Nov-17</a:t>
             </a:fld>
             <a:endParaRPr lang="en-US"/>
           </a:p>
@@ -5313,7 +5313,7 @@
           <a:p>
             <a:fld id="{DFE909EE-B26B-47B1-B3E5-177C23FDE45E}" type="datetimeFigureOut">
               <a:rPr lang="en-US" smtClean="0"/>
-              <a:t>07-Nov-17</a:t>
+              <a:t>08-Nov-17</a:t>
             </a:fld>
             <a:endParaRPr lang="en-US"/>
           </a:p>
@@ -5692,7 +5692,7 @@
           <a:p>
             <a:fld id="{DFE909EE-B26B-47B1-B3E5-177C23FDE45E}" type="datetimeFigureOut">
               <a:rPr lang="en-US" smtClean="0"/>
-              <a:t>07-Nov-17</a:t>
+              <a:t>08-Nov-17</a:t>
             </a:fld>
             <a:endParaRPr lang="en-US"/>
           </a:p>
@@ -5810,7 +5810,7 @@
           <a:p>
             <a:fld id="{DFE909EE-B26B-47B1-B3E5-177C23FDE45E}" type="datetimeFigureOut">
               <a:rPr lang="en-US" smtClean="0"/>
-              <a:t>07-Nov-17</a:t>
+              <a:t>08-Nov-17</a:t>
             </a:fld>
             <a:endParaRPr lang="en-US"/>
           </a:p>
@@ -5905,7 +5905,7 @@
           <a:p>
             <a:fld id="{DFE909EE-B26B-47B1-B3E5-177C23FDE45E}" type="datetimeFigureOut">
               <a:rPr lang="en-US" smtClean="0"/>
-              <a:t>07-Nov-17</a:t>
+              <a:t>08-Nov-17</a:t>
             </a:fld>
             <a:endParaRPr lang="en-US"/>
           </a:p>
@@ -6154,7 +6154,7 @@
           <a:p>
             <a:fld id="{DFE909EE-B26B-47B1-B3E5-177C23FDE45E}" type="datetimeFigureOut">
               <a:rPr lang="en-US" smtClean="0"/>
-              <a:t>07-Nov-17</a:t>
+              <a:t>08-Nov-17</a:t>
             </a:fld>
             <a:endParaRPr lang="en-US"/>
           </a:p>
@@ -6411,7 +6411,7 @@
           <a:p>
             <a:fld id="{DFE909EE-B26B-47B1-B3E5-177C23FDE45E}" type="datetimeFigureOut">
               <a:rPr lang="en-US" smtClean="0"/>
-              <a:t>07-Nov-17</a:t>
+              <a:t>08-Nov-17</a:t>
             </a:fld>
             <a:endParaRPr lang="en-US"/>
           </a:p>
@@ -6654,7 +6654,7 @@
           <a:p>
             <a:fld id="{DFE909EE-B26B-47B1-B3E5-177C23FDE45E}" type="datetimeFigureOut">
               <a:rPr lang="en-US" smtClean="0"/>
-              <a:t>07-Nov-17</a:t>
+              <a:t>08-Nov-17</a:t>
             </a:fld>
             <a:endParaRPr lang="en-US"/>
           </a:p>
@@ -7153,7 +7153,7 @@
             </a:pPr>
             <a:r>
               <a:rPr lang="en-US" sz="3200" dirty="0"/>
-              <a:t>	Veselin Milyoyski (dhtveso)</a:t>
+              <a:t>	Veselin Milyovski (dhtveso)</a:t>
             </a:r>
           </a:p>
           <a:p>
@@ -9191,7 +9191,7 @@
           <a:graphicData uri="http://schemas.openxmlformats.org/presentationml/2006/ole">
             <mc:AlternateContent xmlns:mc="http://schemas.openxmlformats.org/markup-compatibility/2006">
               <mc:Choice xmlns:v="urn:schemas-microsoft-com:vml" Requires="v">
-                <p:oleObj spid="_x0000_s1028" name="Acrobat Document" r:id="rId4" imgW="5238501" imgH="4809839" progId="AcroExch.Document.DC">
+                <p:oleObj spid="_x0000_s1030" name="Acrobat Document" r:id="rId4" imgW="5238501" imgH="4809839" progId="AcroExch.Document.DC">
                   <p:embed/>
                 </p:oleObj>
               </mc:Choice>
@@ -9254,7 +9254,7 @@
           <a:graphicData uri="http://schemas.openxmlformats.org/presentationml/2006/ole">
             <mc:AlternateContent xmlns:mc="http://schemas.openxmlformats.org/markup-compatibility/2006">
               <mc:Choice xmlns:v="urn:schemas-microsoft-com:vml" Requires="v">
-                <p:oleObj spid="_x0000_s1029" name="Acrobat Document" r:id="rId6" imgW="5238501" imgH="4809839" progId="AcroExch.Document.DC">
+                <p:oleObj spid="_x0000_s1031" name="Acrobat Document" r:id="rId6" imgW="5238501" imgH="4809839" progId="AcroExch.Document.DC">
                   <p:embed/>
                 </p:oleObj>
               </mc:Choice>
@@ -9435,7 +9435,7 @@
           <a:graphicData uri="http://schemas.openxmlformats.org/presentationml/2006/ole">
             <mc:AlternateContent xmlns:mc="http://schemas.openxmlformats.org/markup-compatibility/2006">
               <mc:Choice xmlns:v="urn:schemas-microsoft-com:vml" Requires="v">
-                <p:oleObj spid="_x0000_s2052" name="Acrobat Document" r:id="rId4" imgW="5238501" imgH="4809839" progId="AcroExch.Document.DC">
+                <p:oleObj spid="_x0000_s2053" name="Acrobat Document" r:id="rId4" imgW="5238501" imgH="4809839" progId="AcroExch.Document.DC">
                   <p:embed/>
                 </p:oleObj>
               </mc:Choice>

</xml_diff>